<commit_message>
Added a page describing SID
</commit_message>
<xml_diff>
--- a/other_assets/Package_bar_codes.pptx
+++ b/other_assets/Package_bar_codes.pptx
@@ -6,6 +6,8 @@
   </p:sldMasterIdLst>
   <p:sldIdLst>
     <p:sldId id="257" r:id="rId2"/>
+    <p:sldId id="258" r:id="rId3"/>
+    <p:sldId id="259" r:id="rId4"/>
   </p:sldIdLst>
   <p:sldSz cx="12192000" cy="6858000"/>
   <p:notesSz cx="7315200" cy="9601200"/>
@@ -104,6 +106,11 @@
       </a:defRPr>
     </a:lvl9pPr>
   </p:defaultTextStyle>
+  <p:extLst>
+    <p:ext uri="{EFAFB233-063F-42B5-8137-9DF3F51BA10A}">
+      <p15:sldGuideLst xmlns:p15="http://schemas.microsoft.com/office/powerpoint/2012/main"/>
+    </p:ext>
+  </p:extLst>
 </p:presentation>
 </file>
 
@@ -254,7 +261,7 @@
           <a:p>
             <a:fld id="{C6F9143B-CC7D-4D51-BA37-18CE4A8C3EA0}" type="datetimeFigureOut">
               <a:rPr lang="en-US" smtClean="0"/>
-              <a:t>6/20/2025</a:t>
+              <a:t>6/24/2025</a:t>
             </a:fld>
             <a:endParaRPr lang="en-US"/>
           </a:p>
@@ -452,7 +459,7 @@
           <a:p>
             <a:fld id="{C6F9143B-CC7D-4D51-BA37-18CE4A8C3EA0}" type="datetimeFigureOut">
               <a:rPr lang="en-US" smtClean="0"/>
-              <a:t>6/20/2025</a:t>
+              <a:t>6/24/2025</a:t>
             </a:fld>
             <a:endParaRPr lang="en-US"/>
           </a:p>
@@ -660,7 +667,7 @@
           <a:p>
             <a:fld id="{C6F9143B-CC7D-4D51-BA37-18CE4A8C3EA0}" type="datetimeFigureOut">
               <a:rPr lang="en-US" smtClean="0"/>
-              <a:t>6/20/2025</a:t>
+              <a:t>6/24/2025</a:t>
             </a:fld>
             <a:endParaRPr lang="en-US"/>
           </a:p>
@@ -858,7 +865,7 @@
           <a:p>
             <a:fld id="{C6F9143B-CC7D-4D51-BA37-18CE4A8C3EA0}" type="datetimeFigureOut">
               <a:rPr lang="en-US" smtClean="0"/>
-              <a:t>6/20/2025</a:t>
+              <a:t>6/24/2025</a:t>
             </a:fld>
             <a:endParaRPr lang="en-US"/>
           </a:p>
@@ -1133,7 +1140,7 @@
           <a:p>
             <a:fld id="{C6F9143B-CC7D-4D51-BA37-18CE4A8C3EA0}" type="datetimeFigureOut">
               <a:rPr lang="en-US" smtClean="0"/>
-              <a:t>6/20/2025</a:t>
+              <a:t>6/24/2025</a:t>
             </a:fld>
             <a:endParaRPr lang="en-US"/>
           </a:p>
@@ -1398,7 +1405,7 @@
           <a:p>
             <a:fld id="{C6F9143B-CC7D-4D51-BA37-18CE4A8C3EA0}" type="datetimeFigureOut">
               <a:rPr lang="en-US" smtClean="0"/>
-              <a:t>6/20/2025</a:t>
+              <a:t>6/24/2025</a:t>
             </a:fld>
             <a:endParaRPr lang="en-US"/>
           </a:p>
@@ -1810,7 +1817,7 @@
           <a:p>
             <a:fld id="{C6F9143B-CC7D-4D51-BA37-18CE4A8C3EA0}" type="datetimeFigureOut">
               <a:rPr lang="en-US" smtClean="0"/>
-              <a:t>6/20/2025</a:t>
+              <a:t>6/24/2025</a:t>
             </a:fld>
             <a:endParaRPr lang="en-US"/>
           </a:p>
@@ -1951,7 +1958,7 @@
           <a:p>
             <a:fld id="{C6F9143B-CC7D-4D51-BA37-18CE4A8C3EA0}" type="datetimeFigureOut">
               <a:rPr lang="en-US" smtClean="0"/>
-              <a:t>6/20/2025</a:t>
+              <a:t>6/24/2025</a:t>
             </a:fld>
             <a:endParaRPr lang="en-US"/>
           </a:p>
@@ -2064,7 +2071,7 @@
           <a:p>
             <a:fld id="{C6F9143B-CC7D-4D51-BA37-18CE4A8C3EA0}" type="datetimeFigureOut">
               <a:rPr lang="en-US" smtClean="0"/>
-              <a:t>6/20/2025</a:t>
+              <a:t>6/24/2025</a:t>
             </a:fld>
             <a:endParaRPr lang="en-US"/>
           </a:p>
@@ -2375,7 +2382,7 @@
           <a:p>
             <a:fld id="{C6F9143B-CC7D-4D51-BA37-18CE4A8C3EA0}" type="datetimeFigureOut">
               <a:rPr lang="en-US" smtClean="0"/>
-              <a:t>6/20/2025</a:t>
+              <a:t>6/24/2025</a:t>
             </a:fld>
             <a:endParaRPr lang="en-US"/>
           </a:p>
@@ -2663,7 +2670,7 @@
           <a:p>
             <a:fld id="{C6F9143B-CC7D-4D51-BA37-18CE4A8C3EA0}" type="datetimeFigureOut">
               <a:rPr lang="en-US" smtClean="0"/>
-              <a:t>6/20/2025</a:t>
+              <a:t>6/24/2025</a:t>
             </a:fld>
             <a:endParaRPr lang="en-US"/>
           </a:p>
@@ -2904,7 +2911,7 @@
           <a:p>
             <a:fld id="{C6F9143B-CC7D-4D51-BA37-18CE4A8C3EA0}" type="datetimeFigureOut">
               <a:rPr lang="en-US" smtClean="0"/>
-              <a:t>6/20/2025</a:t>
+              <a:t>6/24/2025</a:t>
             </a:fld>
             <a:endParaRPr lang="en-US"/>
           </a:p>
@@ -5076,6 +5083,204 @@
 </p:sld>
 </file>
 
+<file path=ppt/slides/slide2.xml><?xml version="1.0" encoding="utf-8"?>
+<p:sld xmlns:a="http://schemas.openxmlformats.org/drawingml/2006/main" xmlns:r="http://schemas.openxmlformats.org/officeDocument/2006/relationships" xmlns:p="http://schemas.openxmlformats.org/presentationml/2006/main">
+  <p:cSld>
+    <p:bg>
+      <p:bgPr>
+        <a:solidFill>
+          <a:schemeClr val="bg1"/>
+        </a:solidFill>
+        <a:effectLst/>
+      </p:bgPr>
+    </p:bg>
+    <p:spTree>
+      <p:nvGrpSpPr>
+        <p:cNvPr id="1" name=""/>
+        <p:cNvGrpSpPr/>
+        <p:nvPr/>
+      </p:nvGrpSpPr>
+      <p:grpSpPr>
+        <a:xfrm>
+          <a:off x="0" y="0"/>
+          <a:ext cx="0" cy="0"/>
+          <a:chOff x="0" y="0"/>
+          <a:chExt cx="0" cy="0"/>
+        </a:xfrm>
+      </p:grpSpPr>
+      <p:pic>
+        <p:nvPicPr>
+          <p:cNvPr id="1026" name="Picture 2">
+            <a:extLst>
+              <a:ext uri="{FF2B5EF4-FFF2-40B4-BE49-F238E27FC236}">
+                <a16:creationId xmlns:a16="http://schemas.microsoft.com/office/drawing/2014/main" id="{11E48993-89D4-773C-0C53-2AF0291375AF}"/>
+              </a:ext>
+            </a:extLst>
+          </p:cNvPr>
+          <p:cNvPicPr>
+            <a:picLocks noGrp="1" noChangeAspect="1" noChangeArrowheads="1"/>
+          </p:cNvPicPr>
+          <p:nvPr>
+            <p:ph idx="1"/>
+          </p:nvPr>
+        </p:nvPicPr>
+        <p:blipFill>
+          <a:blip r:embed="rId2">
+            <a:extLst>
+              <a:ext uri="{28A0092B-C50C-407E-A947-70E740481C1C}">
+                <a14:useLocalDpi xmlns:a14="http://schemas.microsoft.com/office/drawing/2010/main" val="0"/>
+              </a:ext>
+            </a:extLst>
+          </a:blip>
+          <a:stretch>
+            <a:fillRect/>
+          </a:stretch>
+        </p:blipFill>
+        <p:spPr bwMode="auto">
+          <a:xfrm>
+            <a:off x="5516271" y="585100"/>
+            <a:ext cx="4791117" cy="5571067"/>
+          </a:xfrm>
+          <a:prstGeom prst="rect">
+            <a:avLst/>
+          </a:prstGeom>
+          <a:noFill/>
+          <a:extLst>
+            <a:ext uri="{909E8E84-426E-40DD-AFC4-6F175D3DCCD1}">
+              <a14:hiddenFill xmlns:a14="http://schemas.microsoft.com/office/drawing/2010/main">
+                <a:solidFill>
+                  <a:srgbClr val="FFFFFF"/>
+                </a:solidFill>
+              </a14:hiddenFill>
+            </a:ext>
+          </a:extLst>
+        </p:spPr>
+      </p:pic>
+      <p:sp>
+        <p:nvSpPr>
+          <p:cNvPr id="4" name="TextBox 3">
+            <a:extLst>
+              <a:ext uri="{FF2B5EF4-FFF2-40B4-BE49-F238E27FC236}">
+                <a16:creationId xmlns:a16="http://schemas.microsoft.com/office/drawing/2014/main" id="{2DA7833E-5A99-C7FE-2113-28E2C04673F9}"/>
+              </a:ext>
+            </a:extLst>
+          </p:cNvPr>
+          <p:cNvSpPr txBox="1"/>
+          <p:nvPr/>
+        </p:nvSpPr>
+        <p:spPr>
+          <a:xfrm>
+            <a:off x="356681" y="706877"/>
+            <a:ext cx="4061240" cy="369332"/>
+          </a:xfrm>
+          <a:prstGeom prst="rect">
+            <a:avLst/>
+          </a:prstGeom>
+          <a:noFill/>
+        </p:spPr>
+        <p:txBody>
+          <a:bodyPr wrap="none" rtlCol="0">
+            <a:spAutoFit/>
+          </a:bodyPr>
+          <a:lstStyle/>
+          <a:p>
+            <a:r>
+              <a:rPr lang="en-US" dirty="0"/>
+              <a:t>Sample image of food for you to scan in</a:t>
+            </a:r>
+          </a:p>
+        </p:txBody>
+      </p:sp>
+    </p:spTree>
+    <p:extLst>
+      <p:ext uri="{BB962C8B-B14F-4D97-AF65-F5344CB8AC3E}">
+        <p14:creationId xmlns:p14="http://schemas.microsoft.com/office/powerpoint/2010/main" val="2046048737"/>
+      </p:ext>
+    </p:extLst>
+  </p:cSld>
+  <p:clrMapOvr>
+    <a:masterClrMapping/>
+  </p:clrMapOvr>
+</p:sld>
+</file>
+
+<file path=ppt/slides/slide3.xml><?xml version="1.0" encoding="utf-8"?>
+<p:sld xmlns:a="http://schemas.openxmlformats.org/drawingml/2006/main" xmlns:r="http://schemas.openxmlformats.org/officeDocument/2006/relationships" xmlns:p="http://schemas.openxmlformats.org/presentationml/2006/main">
+  <p:cSld>
+    <p:spTree>
+      <p:nvGrpSpPr>
+        <p:cNvPr id="1" name=""/>
+        <p:cNvGrpSpPr/>
+        <p:nvPr/>
+      </p:nvGrpSpPr>
+      <p:grpSpPr>
+        <a:xfrm>
+          <a:off x="0" y="0"/>
+          <a:ext cx="0" cy="0"/>
+          <a:chOff x="0" y="0"/>
+          <a:chExt cx="0" cy="0"/>
+        </a:xfrm>
+      </p:grpSpPr>
+      <p:pic>
+        <p:nvPicPr>
+          <p:cNvPr id="2050" name="Picture 2" descr="Cheeseburger Bacon: Calories &amp; Nutrition | McDonald's">
+            <a:extLst>
+              <a:ext uri="{FF2B5EF4-FFF2-40B4-BE49-F238E27FC236}">
+                <a16:creationId xmlns:a16="http://schemas.microsoft.com/office/drawing/2014/main" id="{43EECFC9-3E11-A71F-F4F2-6DA59ECAF708}"/>
+              </a:ext>
+            </a:extLst>
+          </p:cNvPr>
+          <p:cNvPicPr>
+            <a:picLocks noChangeAspect="1" noChangeArrowheads="1"/>
+          </p:cNvPicPr>
+          <p:nvPr/>
+        </p:nvPicPr>
+        <p:blipFill rotWithShape="1">
+          <a:blip r:embed="rId2">
+            <a:extLst>
+              <a:ext uri="{28A0092B-C50C-407E-A947-70E740481C1C}">
+                <a14:useLocalDpi xmlns:a14="http://schemas.microsoft.com/office/drawing/2010/main" val="0"/>
+              </a:ext>
+            </a:extLst>
+          </a:blip>
+          <a:srcRect t="29976"/>
+          <a:stretch>
+            <a:fillRect/>
+          </a:stretch>
+        </p:blipFill>
+        <p:spPr bwMode="auto">
+          <a:xfrm>
+            <a:off x="0" y="332458"/>
+            <a:ext cx="8513323" cy="5961338"/>
+          </a:xfrm>
+          <a:prstGeom prst="rect">
+            <a:avLst/>
+          </a:prstGeom>
+          <a:noFill/>
+          <a:extLst>
+            <a:ext uri="{909E8E84-426E-40DD-AFC4-6F175D3DCCD1}">
+              <a14:hiddenFill xmlns:a14="http://schemas.microsoft.com/office/drawing/2010/main">
+                <a:solidFill>
+                  <a:srgbClr val="FFFFFF"/>
+                </a:solidFill>
+              </a14:hiddenFill>
+            </a:ext>
+          </a:extLst>
+        </p:spPr>
+      </p:pic>
+    </p:spTree>
+    <p:extLst>
+      <p:ext uri="{BB962C8B-B14F-4D97-AF65-F5344CB8AC3E}">
+        <p14:creationId xmlns:p14="http://schemas.microsoft.com/office/powerpoint/2010/main" val="653239924"/>
+      </p:ext>
+    </p:extLst>
+  </p:cSld>
+  <p:clrMapOvr>
+    <a:masterClrMapping/>
+  </p:clrMapOvr>
+</p:sld>
+</file>
+
 <file path=ppt/theme/theme1.xml><?xml version="1.0" encoding="utf-8"?>
 <a:theme xmlns:a="http://schemas.openxmlformats.org/drawingml/2006/main" name="Office Theme">
   <a:themeElements>

</xml_diff>